<commit_message>
completely redone architecture entry page
</commit_message>
<xml_diff>
--- a/images/architecture drawings.pptx
+++ b/images/architecture drawings.pptx
@@ -246,7 +246,7 @@
           <a:p>
             <a:fld id="{DC9AA326-EE99-456C-8AE0-599EDAE998F2}" type="datetimeFigureOut">
               <a:rPr lang="en-US" smtClean="0"/>
-              <a:t>08/04/15</a:t>
+              <a:t>09/04/15</a:t>
             </a:fld>
             <a:endParaRPr lang="en-US"/>
           </a:p>
@@ -416,7 +416,7 @@
           <a:p>
             <a:fld id="{DC9AA326-EE99-456C-8AE0-599EDAE998F2}" type="datetimeFigureOut">
               <a:rPr lang="en-US" smtClean="0"/>
-              <a:t>08/04/15</a:t>
+              <a:t>09/04/15</a:t>
             </a:fld>
             <a:endParaRPr lang="en-US"/>
           </a:p>
@@ -596,7 +596,7 @@
           <a:p>
             <a:fld id="{DC9AA326-EE99-456C-8AE0-599EDAE998F2}" type="datetimeFigureOut">
               <a:rPr lang="en-US" smtClean="0"/>
-              <a:t>08/04/15</a:t>
+              <a:t>09/04/15</a:t>
             </a:fld>
             <a:endParaRPr lang="en-US"/>
           </a:p>
@@ -766,7 +766,7 @@
           <a:p>
             <a:fld id="{DC9AA326-EE99-456C-8AE0-599EDAE998F2}" type="datetimeFigureOut">
               <a:rPr lang="en-US" smtClean="0"/>
-              <a:t>08/04/15</a:t>
+              <a:t>09/04/15</a:t>
             </a:fld>
             <a:endParaRPr lang="en-US"/>
           </a:p>
@@ -1012,7 +1012,7 @@
           <a:p>
             <a:fld id="{DC9AA326-EE99-456C-8AE0-599EDAE998F2}" type="datetimeFigureOut">
               <a:rPr lang="en-US" smtClean="0"/>
-              <a:t>08/04/15</a:t>
+              <a:t>09/04/15</a:t>
             </a:fld>
             <a:endParaRPr lang="en-US"/>
           </a:p>
@@ -1244,7 +1244,7 @@
           <a:p>
             <a:fld id="{DC9AA326-EE99-456C-8AE0-599EDAE998F2}" type="datetimeFigureOut">
               <a:rPr lang="en-US" smtClean="0"/>
-              <a:t>08/04/15</a:t>
+              <a:t>09/04/15</a:t>
             </a:fld>
             <a:endParaRPr lang="en-US"/>
           </a:p>
@@ -1611,7 +1611,7 @@
           <a:p>
             <a:fld id="{DC9AA326-EE99-456C-8AE0-599EDAE998F2}" type="datetimeFigureOut">
               <a:rPr lang="en-US" smtClean="0"/>
-              <a:t>08/04/15</a:t>
+              <a:t>09/04/15</a:t>
             </a:fld>
             <a:endParaRPr lang="en-US"/>
           </a:p>
@@ -1729,7 +1729,7 @@
           <a:p>
             <a:fld id="{DC9AA326-EE99-456C-8AE0-599EDAE998F2}" type="datetimeFigureOut">
               <a:rPr lang="en-US" smtClean="0"/>
-              <a:t>08/04/15</a:t>
+              <a:t>09/04/15</a:t>
             </a:fld>
             <a:endParaRPr lang="en-US"/>
           </a:p>
@@ -1824,7 +1824,7 @@
           <a:p>
             <a:fld id="{DC9AA326-EE99-456C-8AE0-599EDAE998F2}" type="datetimeFigureOut">
               <a:rPr lang="en-US" smtClean="0"/>
-              <a:t>08/04/15</a:t>
+              <a:t>09/04/15</a:t>
             </a:fld>
             <a:endParaRPr lang="en-US"/>
           </a:p>
@@ -2101,7 +2101,7 @@
           <a:p>
             <a:fld id="{DC9AA326-EE99-456C-8AE0-599EDAE998F2}" type="datetimeFigureOut">
               <a:rPr lang="en-US" smtClean="0"/>
-              <a:t>08/04/15</a:t>
+              <a:t>09/04/15</a:t>
             </a:fld>
             <a:endParaRPr lang="en-US"/>
           </a:p>
@@ -2354,7 +2354,7 @@
           <a:p>
             <a:fld id="{DC9AA326-EE99-456C-8AE0-599EDAE998F2}" type="datetimeFigureOut">
               <a:rPr lang="en-US" smtClean="0"/>
-              <a:t>08/04/15</a:t>
+              <a:t>09/04/15</a:t>
             </a:fld>
             <a:endParaRPr lang="en-US"/>
           </a:p>
@@ -2567,7 +2567,7 @@
           <a:p>
             <a:fld id="{DC9AA326-EE99-456C-8AE0-599EDAE998F2}" type="datetimeFigureOut">
               <a:rPr lang="en-US" smtClean="0"/>
-              <a:t>08/04/15</a:t>
+              <a:t>09/04/15</a:t>
             </a:fld>
             <a:endParaRPr lang="en-US"/>
           </a:p>
@@ -5817,6 +5817,276 @@
           </a:p>
         </p:txBody>
       </p:sp>
+      <p:sp>
+        <p:nvSpPr>
+          <p:cNvPr id="41" name="Freeform 40"/>
+          <p:cNvSpPr/>
+          <p:nvPr/>
+        </p:nvSpPr>
+        <p:spPr>
+          <a:xfrm flipH="1" flipV="1">
+            <a:off x="1362191" y="3815514"/>
+            <a:ext cx="1013286" cy="934753"/>
+          </a:xfrm>
+          <a:custGeom>
+            <a:avLst/>
+            <a:gdLst>
+              <a:gd name="connsiteX0" fmla="*/ 0 w 1158240"/>
+              <a:gd name="connsiteY0" fmla="*/ 0 h 719328"/>
+              <a:gd name="connsiteX1" fmla="*/ 1158240 w 1158240"/>
+              <a:gd name="connsiteY1" fmla="*/ 719328 h 719328"/>
+              <a:gd name="connsiteX0" fmla="*/ 0 w 1158240"/>
+              <a:gd name="connsiteY0" fmla="*/ 0 h 719328"/>
+              <a:gd name="connsiteX1" fmla="*/ 1158240 w 1158240"/>
+              <a:gd name="connsiteY1" fmla="*/ 719328 h 719328"/>
+              <a:gd name="connsiteX0" fmla="*/ 0 w 1158240"/>
+              <a:gd name="connsiteY0" fmla="*/ 0 h 719328"/>
+              <a:gd name="connsiteX1" fmla="*/ 1158240 w 1158240"/>
+              <a:gd name="connsiteY1" fmla="*/ 719328 h 719328"/>
+              <a:gd name="connsiteX0" fmla="*/ 0 w 1160661"/>
+              <a:gd name="connsiteY0" fmla="*/ 0 h 719328"/>
+              <a:gd name="connsiteX1" fmla="*/ 1158240 w 1160661"/>
+              <a:gd name="connsiteY1" fmla="*/ 719328 h 719328"/>
+              <a:gd name="connsiteX0" fmla="*/ 0 w 1158240"/>
+              <a:gd name="connsiteY0" fmla="*/ 0 h 719328"/>
+              <a:gd name="connsiteX1" fmla="*/ 1158240 w 1158240"/>
+              <a:gd name="connsiteY1" fmla="*/ 719328 h 719328"/>
+              <a:gd name="connsiteX0" fmla="*/ 0 w 1158240"/>
+              <a:gd name="connsiteY0" fmla="*/ 0 h 719328"/>
+              <a:gd name="connsiteX1" fmla="*/ 1158240 w 1158240"/>
+              <a:gd name="connsiteY1" fmla="*/ 719328 h 719328"/>
+              <a:gd name="connsiteX0" fmla="*/ 0 w 1158240"/>
+              <a:gd name="connsiteY0" fmla="*/ 0 h 719328"/>
+              <a:gd name="connsiteX1" fmla="*/ 1158240 w 1158240"/>
+              <a:gd name="connsiteY1" fmla="*/ 719328 h 719328"/>
+              <a:gd name="connsiteX0" fmla="*/ 0 w 1158240"/>
+              <a:gd name="connsiteY0" fmla="*/ 0 h 719328"/>
+              <a:gd name="connsiteX1" fmla="*/ 1158240 w 1158240"/>
+              <a:gd name="connsiteY1" fmla="*/ 719328 h 719328"/>
+            </a:gdLst>
+            <a:ahLst/>
+            <a:cxnLst>
+              <a:cxn ang="0">
+                <a:pos x="connsiteX0" y="connsiteY0"/>
+              </a:cxn>
+              <a:cxn ang="0">
+                <a:pos x="connsiteX1" y="connsiteY1"/>
+              </a:cxn>
+            </a:cxnLst>
+            <a:rect l="l" t="t" r="r" b="b"/>
+            <a:pathLst>
+              <a:path w="1158240" h="719328">
+                <a:moveTo>
+                  <a:pt x="0" y="0"/>
+                </a:moveTo>
+                <a:cubicBezTo>
+                  <a:pt x="568960" y="56896"/>
+                  <a:pt x="894080" y="52832"/>
+                  <a:pt x="1158240" y="719328"/>
+                </a:cubicBezTo>
+              </a:path>
+            </a:pathLst>
+          </a:custGeom>
+          <a:noFill/>
+          <a:ln w="22225">
+            <a:solidFill>
+              <a:srgbClr val="00CCFF"/>
+            </a:solidFill>
+            <a:prstDash val="dash"/>
+            <a:headEnd type="none"/>
+            <a:tailEnd type="arrow"/>
+          </a:ln>
+        </p:spPr>
+        <p:style>
+          <a:lnRef idx="2">
+            <a:schemeClr val="accent1">
+              <a:shade val="50000"/>
+            </a:schemeClr>
+          </a:lnRef>
+          <a:fillRef idx="1">
+            <a:schemeClr val="accent1"/>
+          </a:fillRef>
+          <a:effectRef idx="0">
+            <a:schemeClr val="accent1"/>
+          </a:effectRef>
+          <a:fontRef idx="minor">
+            <a:schemeClr val="lt1"/>
+          </a:fontRef>
+        </p:style>
+        <p:txBody>
+          <a:bodyPr rtlCol="0" anchor="ctr"/>
+          <a:lstStyle/>
+          <a:p>
+            <a:pPr algn="ctr"/>
+            <a:endParaRPr lang="en-GB"/>
+          </a:p>
+        </p:txBody>
+      </p:sp>
+      <p:sp>
+        <p:nvSpPr>
+          <p:cNvPr id="42" name="TextBox 41"/>
+          <p:cNvSpPr txBox="1"/>
+          <p:nvPr/>
+        </p:nvSpPr>
+        <p:spPr>
+          <a:xfrm>
+            <a:off x="2375477" y="4535057"/>
+            <a:ext cx="753732" cy="369332"/>
+          </a:xfrm>
+          <a:prstGeom prst="rect">
+            <a:avLst/>
+          </a:prstGeom>
+          <a:noFill/>
+        </p:spPr>
+        <p:txBody>
+          <a:bodyPr wrap="none" rtlCol="0">
+            <a:spAutoFit/>
+          </a:bodyPr>
+          <a:lstStyle/>
+          <a:p>
+            <a:r>
+              <a:rPr lang="nl-BE" dirty="0" smtClean="0"/>
+              <a:t>Origin</a:t>
+            </a:r>
+            <a:endParaRPr lang="en-US" dirty="0"/>
+          </a:p>
+        </p:txBody>
+      </p:sp>
+      <p:sp>
+        <p:nvSpPr>
+          <p:cNvPr id="43" name="Freeform 42"/>
+          <p:cNvSpPr/>
+          <p:nvPr/>
+        </p:nvSpPr>
+        <p:spPr>
+          <a:xfrm rot="11800446" flipH="1" flipV="1">
+            <a:off x="9769446" y="1139969"/>
+            <a:ext cx="922769" cy="400114"/>
+          </a:xfrm>
+          <a:custGeom>
+            <a:avLst/>
+            <a:gdLst>
+              <a:gd name="connsiteX0" fmla="*/ 0 w 1158240"/>
+              <a:gd name="connsiteY0" fmla="*/ 0 h 719328"/>
+              <a:gd name="connsiteX1" fmla="*/ 1158240 w 1158240"/>
+              <a:gd name="connsiteY1" fmla="*/ 719328 h 719328"/>
+              <a:gd name="connsiteX0" fmla="*/ 0 w 1158240"/>
+              <a:gd name="connsiteY0" fmla="*/ 0 h 719328"/>
+              <a:gd name="connsiteX1" fmla="*/ 1158240 w 1158240"/>
+              <a:gd name="connsiteY1" fmla="*/ 719328 h 719328"/>
+              <a:gd name="connsiteX0" fmla="*/ 0 w 1158240"/>
+              <a:gd name="connsiteY0" fmla="*/ 0 h 719328"/>
+              <a:gd name="connsiteX1" fmla="*/ 1158240 w 1158240"/>
+              <a:gd name="connsiteY1" fmla="*/ 719328 h 719328"/>
+              <a:gd name="connsiteX0" fmla="*/ 0 w 1160661"/>
+              <a:gd name="connsiteY0" fmla="*/ 0 h 719328"/>
+              <a:gd name="connsiteX1" fmla="*/ 1158240 w 1160661"/>
+              <a:gd name="connsiteY1" fmla="*/ 719328 h 719328"/>
+              <a:gd name="connsiteX0" fmla="*/ 0 w 1158240"/>
+              <a:gd name="connsiteY0" fmla="*/ 0 h 719328"/>
+              <a:gd name="connsiteX1" fmla="*/ 1158240 w 1158240"/>
+              <a:gd name="connsiteY1" fmla="*/ 719328 h 719328"/>
+              <a:gd name="connsiteX0" fmla="*/ 0 w 1158240"/>
+              <a:gd name="connsiteY0" fmla="*/ 0 h 719328"/>
+              <a:gd name="connsiteX1" fmla="*/ 1158240 w 1158240"/>
+              <a:gd name="connsiteY1" fmla="*/ 719328 h 719328"/>
+              <a:gd name="connsiteX0" fmla="*/ 0 w 1158240"/>
+              <a:gd name="connsiteY0" fmla="*/ 0 h 719328"/>
+              <a:gd name="connsiteX1" fmla="*/ 1158240 w 1158240"/>
+              <a:gd name="connsiteY1" fmla="*/ 719328 h 719328"/>
+              <a:gd name="connsiteX0" fmla="*/ 0 w 1158240"/>
+              <a:gd name="connsiteY0" fmla="*/ 0 h 719328"/>
+              <a:gd name="connsiteX1" fmla="*/ 1158240 w 1158240"/>
+              <a:gd name="connsiteY1" fmla="*/ 719328 h 719328"/>
+            </a:gdLst>
+            <a:ahLst/>
+            <a:cxnLst>
+              <a:cxn ang="0">
+                <a:pos x="connsiteX0" y="connsiteY0"/>
+              </a:cxn>
+              <a:cxn ang="0">
+                <a:pos x="connsiteX1" y="connsiteY1"/>
+              </a:cxn>
+            </a:cxnLst>
+            <a:rect l="l" t="t" r="r" b="b"/>
+            <a:pathLst>
+              <a:path w="1158240" h="719328">
+                <a:moveTo>
+                  <a:pt x="0" y="0"/>
+                </a:moveTo>
+                <a:cubicBezTo>
+                  <a:pt x="568960" y="56896"/>
+                  <a:pt x="894080" y="52832"/>
+                  <a:pt x="1158240" y="719328"/>
+                </a:cubicBezTo>
+              </a:path>
+            </a:pathLst>
+          </a:custGeom>
+          <a:noFill/>
+          <a:ln w="22225">
+            <a:solidFill>
+              <a:srgbClr val="00CCFF"/>
+            </a:solidFill>
+            <a:prstDash val="dash"/>
+            <a:headEnd type="none"/>
+            <a:tailEnd type="arrow"/>
+          </a:ln>
+        </p:spPr>
+        <p:style>
+          <a:lnRef idx="2">
+            <a:schemeClr val="accent1">
+              <a:shade val="50000"/>
+            </a:schemeClr>
+          </a:lnRef>
+          <a:fillRef idx="1">
+            <a:schemeClr val="accent1"/>
+          </a:fillRef>
+          <a:effectRef idx="0">
+            <a:schemeClr val="accent1"/>
+          </a:effectRef>
+          <a:fontRef idx="minor">
+            <a:schemeClr val="lt1"/>
+          </a:fontRef>
+        </p:style>
+        <p:txBody>
+          <a:bodyPr rtlCol="0" anchor="ctr"/>
+          <a:lstStyle/>
+          <a:p>
+            <a:pPr algn="ctr"/>
+            <a:endParaRPr lang="en-GB"/>
+          </a:p>
+        </p:txBody>
+      </p:sp>
+      <p:sp>
+        <p:nvSpPr>
+          <p:cNvPr id="44" name="TextBox 43"/>
+          <p:cNvSpPr txBox="1"/>
+          <p:nvPr/>
+        </p:nvSpPr>
+        <p:spPr>
+          <a:xfrm>
+            <a:off x="9065951" y="646665"/>
+            <a:ext cx="1263616" cy="369332"/>
+          </a:xfrm>
+          <a:prstGeom prst="rect">
+            <a:avLst/>
+          </a:prstGeom>
+          <a:noFill/>
+        </p:spPr>
+        <p:txBody>
+          <a:bodyPr wrap="none" rtlCol="0">
+            <a:spAutoFit/>
+          </a:bodyPr>
+          <a:lstStyle/>
+          <a:p>
+            <a:r>
+              <a:rPr lang="nl-BE" smtClean="0"/>
+              <a:t>Destination</a:t>
+            </a:r>
+            <a:endParaRPr lang="en-US" dirty="0"/>
+          </a:p>
+        </p:txBody>
+      </p:sp>
     </p:spTree>
     <p:extLst>
       <p:ext uri="{BB962C8B-B14F-4D97-AF65-F5344CB8AC3E}">
@@ -6135,6 +6405,150 @@
                                   </p:childTnLst>
                                 </p:cTn>
                               </p:par>
+                              <p:par>
+                                <p:cTn id="29" presetID="1" presetClass="entr" presetSubtype="0" fill="hold" grpId="0" nodeType="withEffect">
+                                  <p:stCondLst>
+                                    <p:cond delay="0"/>
+                                  </p:stCondLst>
+                                  <p:childTnLst>
+                                    <p:set>
+                                      <p:cBhvr>
+                                        <p:cTn id="30" dur="1" fill="hold">
+                                          <p:stCondLst>
+                                            <p:cond delay="0"/>
+                                          </p:stCondLst>
+                                        </p:cTn>
+                                        <p:tgtEl>
+                                          <p:spTgt spid="41"/>
+                                        </p:tgtEl>
+                                        <p:attrNameLst>
+                                          <p:attrName>style.visibility</p:attrName>
+                                        </p:attrNameLst>
+                                      </p:cBhvr>
+                                      <p:to>
+                                        <p:strVal val="visible"/>
+                                      </p:to>
+                                    </p:set>
+                                  </p:childTnLst>
+                                </p:cTn>
+                              </p:par>
+                            </p:childTnLst>
+                          </p:cTn>
+                        </p:par>
+                      </p:childTnLst>
+                    </p:cTn>
+                  </p:par>
+                  <p:par>
+                    <p:cTn id="31" fill="hold">
+                      <p:stCondLst>
+                        <p:cond delay="indefinite"/>
+                      </p:stCondLst>
+                      <p:childTnLst>
+                        <p:par>
+                          <p:cTn id="32" fill="hold">
+                            <p:stCondLst>
+                              <p:cond delay="0"/>
+                            </p:stCondLst>
+                            <p:childTnLst>
+                              <p:par>
+                                <p:cTn id="33" presetID="1" presetClass="entr" presetSubtype="0" fill="hold" grpId="0" nodeType="clickEffect">
+                                  <p:stCondLst>
+                                    <p:cond delay="0"/>
+                                  </p:stCondLst>
+                                  <p:childTnLst>
+                                    <p:set>
+                                      <p:cBhvr>
+                                        <p:cTn id="34" dur="1" fill="hold">
+                                          <p:stCondLst>
+                                            <p:cond delay="0"/>
+                                          </p:stCondLst>
+                                        </p:cTn>
+                                        <p:tgtEl>
+                                          <p:spTgt spid="42"/>
+                                        </p:tgtEl>
+                                        <p:attrNameLst>
+                                          <p:attrName>style.visibility</p:attrName>
+                                        </p:attrNameLst>
+                                      </p:cBhvr>
+                                      <p:to>
+                                        <p:strVal val="visible"/>
+                                      </p:to>
+                                    </p:set>
+                                  </p:childTnLst>
+                                </p:cTn>
+                              </p:par>
+                              <p:par>
+                                <p:cTn id="35" presetID="1" presetClass="entr" presetSubtype="0" fill="hold" grpId="0" nodeType="withEffect">
+                                  <p:stCondLst>
+                                    <p:cond delay="0"/>
+                                  </p:stCondLst>
+                                  <p:childTnLst>
+                                    <p:set>
+                                      <p:cBhvr>
+                                        <p:cTn id="36" dur="1" fill="hold">
+                                          <p:stCondLst>
+                                            <p:cond delay="0"/>
+                                          </p:stCondLst>
+                                        </p:cTn>
+                                        <p:tgtEl>
+                                          <p:spTgt spid="43"/>
+                                        </p:tgtEl>
+                                        <p:attrNameLst>
+                                          <p:attrName>style.visibility</p:attrName>
+                                        </p:attrNameLst>
+                                      </p:cBhvr>
+                                      <p:to>
+                                        <p:strVal val="visible"/>
+                                      </p:to>
+                                    </p:set>
+                                  </p:childTnLst>
+                                </p:cTn>
+                              </p:par>
+                            </p:childTnLst>
+                          </p:cTn>
+                        </p:par>
+                      </p:childTnLst>
+                    </p:cTn>
+                  </p:par>
+                  <p:par>
+                    <p:cTn id="37" fill="hold">
+                      <p:stCondLst>
+                        <p:cond delay="indefinite"/>
+                      </p:stCondLst>
+                      <p:childTnLst>
+                        <p:par>
+                          <p:cTn id="38" fill="hold">
+                            <p:stCondLst>
+                              <p:cond delay="0"/>
+                            </p:stCondLst>
+                            <p:childTnLst>
+                              <p:par>
+                                <p:cTn id="39" presetID="1" presetClass="entr" presetSubtype="0" fill="hold" grpId="0" nodeType="clickEffect">
+                                  <p:stCondLst>
+                                    <p:cond delay="0"/>
+                                  </p:stCondLst>
+                                  <p:childTnLst>
+                                    <p:set>
+                                      <p:cBhvr>
+                                        <p:cTn id="40" dur="1" fill="hold">
+                                          <p:stCondLst>
+                                            <p:cond delay="0"/>
+                                          </p:stCondLst>
+                                        </p:cTn>
+                                        <p:tgtEl>
+                                          <p:spTgt spid="44"/>
+                                        </p:tgtEl>
+                                        <p:attrNameLst>
+                                          <p:attrName>style.visibility</p:attrName>
+                                        </p:attrNameLst>
+                                      </p:cBhvr>
+                                      <p:to>
+                                        <p:strVal val="visible"/>
+                                      </p:to>
+                                    </p:set>
+                                  </p:childTnLst>
+                                </p:cTn>
+                              </p:par>
                             </p:childTnLst>
                           </p:cTn>
                         </p:par>
@@ -6171,6 +6585,10 @@
       <p:bldP spid="36" grpId="0" animBg="1"/>
       <p:bldP spid="46" grpId="0" animBg="1"/>
       <p:bldP spid="47" grpId="0"/>
+      <p:bldP spid="41" grpId="0" animBg="1"/>
+      <p:bldP spid="42" grpId="0"/>
+      <p:bldP spid="43" grpId="0" animBg="1"/>
+      <p:bldP spid="44" grpId="0"/>
     </p:bldLst>
   </p:timing>
 </p:sld>

</xml_diff>